<commit_message>
updated grammar and presentation
</commit_message>
<xml_diff>
--- a/presentation/1 (4.11.).pptx
+++ b/presentation/1 (4.11.).pptx
@@ -106,6 +106,11 @@
       </a:defRPr>
     </a:lvl9pPr>
   </p:defaultTextStyle>
+  <p:extLst>
+    <p:ext uri="{EFAFB233-063F-42B5-8137-9DF3F51BA10A}">
+      <p15:sldGuideLst xmlns:p15="http://schemas.microsoft.com/office/powerpoint/2012/main"/>
+    </p:ext>
+  </p:extLst>
 </p:presentation>
 </file>
 
@@ -3220,14 +3225,14 @@
           <p:nvPr>
             <p:extLst>
               <p:ext uri="{D42A27DB-BD31-4B8C-83A1-F6EECF244321}">
-                <p14:modId xmlns:p14="http://schemas.microsoft.com/office/powerpoint/2010/main" val="328719726"/>
+                <p14:modId xmlns:p14="http://schemas.microsoft.com/office/powerpoint/2010/main" val="1489772180"/>
               </p:ext>
             </p:extLst>
           </p:nvPr>
         </p:nvGraphicFramePr>
         <p:xfrm>
           <a:off x="1178560" y="1690689"/>
-          <a:ext cx="10175240" cy="4777169"/>
+          <a:ext cx="10175240" cy="4669471"/>
         </p:xfrm>
         <a:graphic>
           <a:graphicData uri="http://schemas.openxmlformats.org/drawingml/2006/table">
@@ -3856,15 +3861,40 @@
                       </a:endParaRPr>
                     </a:p>
                     <a:p>
-                      <a:pPr lvl="1" algn="l"/>
-                      <a:endParaRPr lang="cs-CZ" dirty="0" smtClean="0">
-                        <a:solidFill>
-                          <a:schemeClr val="tx1"/>
-                        </a:solidFill>
-                      </a:endParaRPr>
-                    </a:p>
-                    <a:p>
-                      <a:pPr algn="l"/>
+                      <a:pPr marL="342900" marR="0" lvl="0" indent="-342900" algn="l" defTabSz="914400" rtl="0" eaLnBrk="1" fontAlgn="auto" latinLnBrk="0" hangingPunct="1">
+                        <a:lnSpc>
+                          <a:spcPct val="100000"/>
+                        </a:lnSpc>
+                        <a:spcBef>
+                          <a:spcPts val="0"/>
+                        </a:spcBef>
+                        <a:spcAft>
+                          <a:spcPts val="0"/>
+                        </a:spcAft>
+                        <a:buClrTx/>
+                        <a:buSzTx/>
+                        <a:buFont typeface="Arial" panose="020B0604020202020204" pitchFamily="34" charset="0"/>
+                        <a:buChar char="•"/>
+                        <a:tabLst/>
+                        <a:defRPr/>
+                      </a:pPr>
+                      <a:r>
+                        <a:rPr kumimoji="0" lang="cs-CZ" sz="2400" b="0" i="0" u="none" strike="noStrike" kern="1200" cap="none" spc="0" normalizeH="0" baseline="0" noProof="0" dirty="0" smtClean="0">
+                          <a:ln>
+                            <a:noFill/>
+                          </a:ln>
+                          <a:solidFill>
+                            <a:prstClr val="black"/>
+                          </a:solidFill>
+                          <a:effectLst/>
+                          <a:uLnTx/>
+                          <a:uFillTx/>
+                          <a:latin typeface="+mn-lt"/>
+                          <a:ea typeface="+mn-ea"/>
+                          <a:cs typeface="+mn-cs"/>
+                        </a:rPr>
+                        <a:t>příkazy pro vstup a výstup</a:t>
+                      </a:r>
                       <a:endParaRPr lang="cs-CZ" dirty="0">
                         <a:solidFill>
                           <a:schemeClr val="tx1"/>

</xml_diff>